<commit_message>
updated the intro slide and samples
</commit_message>
<xml_diff>
--- a/1.Introduction.pptx
+++ b/1.Introduction.pptx
@@ -5,20 +5,19 @@
     <p:sldMasterId id="2147483660" r:id="rId4"/>
   </p:sldMasterIdLst>
   <p:notesMasterIdLst>
-    <p:notesMasterId r:id="rId13"/>
+    <p:notesMasterId r:id="rId12"/>
   </p:notesMasterIdLst>
   <p:handoutMasterIdLst>
-    <p:handoutMasterId r:id="rId14"/>
+    <p:handoutMasterId r:id="rId13"/>
   </p:handoutMasterIdLst>
   <p:sldIdLst>
     <p:sldId id="348" r:id="rId5"/>
     <p:sldId id="317" r:id="rId6"/>
     <p:sldId id="367" r:id="rId7"/>
     <p:sldId id="392" r:id="rId8"/>
-    <p:sldId id="397" r:id="rId9"/>
-    <p:sldId id="393" r:id="rId10"/>
-    <p:sldId id="396" r:id="rId11"/>
-    <p:sldId id="395" r:id="rId12"/>
+    <p:sldId id="393" r:id="rId9"/>
+    <p:sldId id="396" r:id="rId10"/>
+    <p:sldId id="395" r:id="rId11"/>
   </p:sldIdLst>
   <p:sldSz cx="12192000" cy="6858000"/>
   <p:notesSz cx="6858000" cy="9144000"/>
@@ -126,7 +125,6 @@
             <p14:sldId id="317"/>
             <p14:sldId id="367"/>
             <p14:sldId id="392"/>
-            <p14:sldId id="397"/>
             <p14:sldId id="393"/>
             <p14:sldId id="396"/>
             <p14:sldId id="395"/>
@@ -142,6 +140,58 @@
     </p:ext>
   </p:extLst>
 </p:presentation>
+</file>
+
+<file path=ppt/revisionInfo.xml><?xml version="1.0" encoding="utf-8"?>
+<p1510:revInfo xmlns:a="http://schemas.openxmlformats.org/drawingml/2006/main" xmlns:r="http://schemas.openxmlformats.org/officeDocument/2006/relationships" xmlns:p1510="http://schemas.microsoft.com/office/powerpoint/2015/10/main">
+  <p1510:revLst>
+    <p1510:client id="{E78558EB-8B3B-41F0-A3B8-70F7B755CA2C}" v="9" dt="2020-05-18T16:27:35.021"/>
+  </p1510:revLst>
+</p1510:revInfo>
+</file>
+
+<file path=ppt/changesInfos/changesInfo1.xml><?xml version="1.0" encoding="utf-8"?>
+<pc:chgInfo xmlns:a="http://schemas.openxmlformats.org/drawingml/2006/main" xmlns:r="http://schemas.openxmlformats.org/officeDocument/2006/relationships" xmlns:ac="http://schemas.microsoft.com/office/drawing/2013/main/command" xmlns:pc="http://schemas.microsoft.com/office/powerpoint/2013/main/command">
+  <pc:docChgLst>
+    <pc:chgData name="Trilok Chowdary (Byteridge Software Private Lim)" userId="S::v-trchow@microsoft.com::3df9efb5-6980-4313-85dd-81b2fb03b9c2" providerId="AD" clId="Web-{E78558EB-8B3B-41F0-A3B8-70F7B755CA2C}"/>
+    <pc:docChg chg="modSld">
+      <pc:chgData name="Trilok Chowdary (Byteridge Software Private Lim)" userId="S::v-trchow@microsoft.com::3df9efb5-6980-4313-85dd-81b2fb03b9c2" providerId="AD" clId="Web-{E78558EB-8B3B-41F0-A3B8-70F7B755CA2C}" dt="2020-05-18T16:27:35.021" v="7"/>
+      <pc:docMkLst>
+        <pc:docMk/>
+      </pc:docMkLst>
+      <pc:sldChg chg="modSp">
+        <pc:chgData name="Trilok Chowdary (Byteridge Software Private Lim)" userId="S::v-trchow@microsoft.com::3df9efb5-6980-4313-85dd-81b2fb03b9c2" providerId="AD" clId="Web-{E78558EB-8B3B-41F0-A3B8-70F7B755CA2C}" dt="2020-05-18T16:27:35.021" v="7"/>
+        <pc:sldMkLst>
+          <pc:docMk/>
+          <pc:sldMk cId="223729632" sldId="348"/>
+        </pc:sldMkLst>
+        <pc:spChg chg="mod">
+          <ac:chgData name="Trilok Chowdary (Byteridge Software Private Lim)" userId="S::v-trchow@microsoft.com::3df9efb5-6980-4313-85dd-81b2fb03b9c2" providerId="AD" clId="Web-{E78558EB-8B3B-41F0-A3B8-70F7B755CA2C}" dt="2020-05-18T16:27:35.021" v="7"/>
+          <ac:spMkLst>
+            <pc:docMk/>
+            <pc:sldMk cId="223729632" sldId="348"/>
+            <ac:spMk id="4" creationId="{00000000-0000-0000-0000-000000000000}"/>
+          </ac:spMkLst>
+        </pc:spChg>
+      </pc:sldChg>
+      <pc:sldChg chg="modSp">
+        <pc:chgData name="Trilok Chowdary (Byteridge Software Private Lim)" userId="S::v-trchow@microsoft.com::3df9efb5-6980-4313-85dd-81b2fb03b9c2" providerId="AD" clId="Web-{E78558EB-8B3B-41F0-A3B8-70F7B755CA2C}" dt="2020-05-18T16:26:55.269" v="4" actId="20577"/>
+        <pc:sldMkLst>
+          <pc:docMk/>
+          <pc:sldMk cId="2373576358" sldId="392"/>
+        </pc:sldMkLst>
+        <pc:spChg chg="mod">
+          <ac:chgData name="Trilok Chowdary (Byteridge Software Private Lim)" userId="S::v-trchow@microsoft.com::3df9efb5-6980-4313-85dd-81b2fb03b9c2" providerId="AD" clId="Web-{E78558EB-8B3B-41F0-A3B8-70F7B755CA2C}" dt="2020-05-18T16:26:55.269" v="4" actId="20577"/>
+          <ac:spMkLst>
+            <pc:docMk/>
+            <pc:sldMk cId="2373576358" sldId="392"/>
+            <ac:spMk id="4" creationId="{00000000-0000-0000-0000-000000000000}"/>
+          </ac:spMkLst>
+        </pc:spChg>
+      </pc:sldChg>
+    </pc:docChg>
+  </pc:docChgLst>
+</pc:chgInfo>
 </file>
 
 <file path=ppt/handoutMasters/handoutMaster1.xml><?xml version="1.0" encoding="utf-8"?>
@@ -226,7 +276,7 @@
           <a:p>
             <a:fld id="{312E7B4A-039C-48A2-9B2C-AF16AA3873D8}" type="datetimeFigureOut">
               <a:rPr lang="en-US" smtClean="0"/>
-              <a:t>5/21/2019</a:t>
+              <a:t>5/18/2020</a:t>
             </a:fld>
             <a:endParaRPr lang="en-US"/>
           </a:p>
@@ -391,7 +441,7 @@
           <a:p>
             <a:fld id="{DA005A0C-54D9-45AA-87D4-C551D08DFCE1}" type="datetimeFigureOut">
               <a:rPr lang="en-US" smtClean="0"/>
-              <a:t>5/21/2019</a:t>
+              <a:t>5/18/2020</a:t>
             </a:fld>
             <a:endParaRPr lang="en-US"/>
           </a:p>
@@ -3444,9 +3494,7 @@
             <a:avLst/>
           </a:prstGeom>
           <a:solidFill>
-            <a:srgbClr val="681684">
-              <a:alpha val="85000"/>
-            </a:srgbClr>
+            <a:srgbClr val="FF0000"/>
           </a:solidFill>
         </p:spPr>
         <p:txBody>
@@ -3560,7 +3608,7 @@
                 <a:latin typeface="Segoe UI Light" pitchFamily="34" charset="0"/>
                 <a:cs typeface="Segoe UI" pitchFamily="34" charset="0"/>
               </a:rPr>
-              <a:t>IDC Foundry Hyderabad</a:t>
+              <a:t>Garage India Internship Hyderabad</a:t>
             </a:r>
           </a:p>
           <a:p>
@@ -3833,16 +3881,35 @@
           <a:p>
             <a:r>
               <a:rPr lang="en-IN" dirty="0"/>
-              <a:t>Speakers – </a:t>
+              <a:t>Speakers – Vinayak, Trilok, Prakash, </a:t>
             </a:r>
             <a:r>
               <a:rPr lang="en-IN" dirty="0" err="1"/>
-              <a:t>Vinayak,Trilok</a:t>
+              <a:t>Sravani</a:t>
             </a:r>
             <a:r>
               <a:rPr lang="en-IN" dirty="0"/>
-              <a:t>, Netaji, Lakshmi, Shubham</a:t>
-            </a:r>
+              <a:t>, </a:t>
+            </a:r>
+            <a:r>
+              <a:rPr lang="en-IN" dirty="0" err="1"/>
+              <a:t>Santhan</a:t>
+            </a:r>
+            <a:r>
+              <a:rPr lang="en-IN" dirty="0"/>
+              <a:t>, Mrinal,  </a:t>
+            </a:r>
+            <a:r>
+              <a:rPr lang="en-IN" dirty="0" err="1"/>
+              <a:t>Saiteja</a:t>
+            </a:r>
+            <a:r>
+              <a:rPr lang="en-IN" dirty="0"/>
+              <a:t>, Surya, Satish, Manjunath, Jeetendra Pandey and Sanjeev’s Team</a:t>
+            </a:r>
+          </a:p>
+          <a:p>
+            <a:endParaRPr lang="en-IN" dirty="0"/>
           </a:p>
         </p:txBody>
       </p:sp>
@@ -3903,14 +3970,8 @@
             </a:pPr>
             <a:r>
               <a:rPr lang="en-US" sz="1800" dirty="0"/>
-              <a:t>Life Compass - live your goals*</a:t>
-            </a:r>
-          </a:p>
-          <a:p>
-            <a:pPr marL="0" indent="0" algn="ctr">
-              <a:buNone/>
-            </a:pPr>
-            <a:endParaRPr lang="en-US" sz="1800" dirty="0"/>
+              <a:t>Carbon Dashboard</a:t>
+            </a:r>
           </a:p>
         </p:txBody>
       </p:sp>
@@ -3926,23 +3987,30 @@
         </p:nvSpPr>
         <p:spPr>
           <a:xfrm>
-            <a:off x="379514" y="132110"/>
-            <a:ext cx="11524432" cy="1063487"/>
+            <a:off x="83976" y="132110"/>
+            <a:ext cx="11819970" cy="1063487"/>
           </a:xfrm>
         </p:spPr>
         <p:txBody>
-          <a:bodyPr/>
+          <a:bodyPr>
+            <a:normAutofit/>
+          </a:bodyPr>
           <a:lstStyle/>
           <a:p>
             <a:pPr algn="ctr"/>
             <a:r>
-              <a:rPr lang="en-IN" dirty="0"/>
-              <a:t>Foundry Projects - Hyderabad</a:t>
+              <a:rPr lang="en-IN" dirty="0">
+                <a:latin typeface="Segoe UI Light"/>
+                <a:cs typeface="Segoe UI Light"/>
+              </a:rPr>
+              <a:t>The Garage India Internship Projects </a:t>
             </a:r>
             <a:endParaRPr lang="en-IN" dirty="0">
               <a:solidFill>
                 <a:srgbClr val="FF0000"/>
               </a:solidFill>
+              <a:latin typeface="Segoe UI Light"/>
+              <a:cs typeface="Segoe UI Light"/>
             </a:endParaRPr>
           </a:p>
         </p:txBody>
@@ -3973,13 +4041,10 @@
               <a:buNone/>
             </a:pPr>
             <a:r>
-              <a:rPr lang="fr-FR" sz="1800" dirty="0" err="1"/>
-              <a:t>Seshat</a:t>
-            </a:r>
-            <a:r>
-              <a:rPr lang="fr-FR" sz="1800" dirty="0"/>
-              <a:t>: a content intelligence platform</a:t>
-            </a:r>
+              <a:rPr lang="en-US" sz="1800" dirty="0"/>
+              <a:t>Operational Evolution and Sustainability Based on Megatrends</a:t>
+            </a:r>
+            <a:endParaRPr lang="fr-FR" sz="1800" dirty="0"/>
           </a:p>
         </p:txBody>
       </p:sp>
@@ -3995,13 +4060,13 @@
         </p:nvSpPr>
         <p:spPr>
           <a:xfrm>
-            <a:off x="8079897" y="1371599"/>
-            <a:ext cx="3283113" cy="788795"/>
+            <a:off x="354389" y="4165872"/>
+            <a:ext cx="3629781" cy="1133915"/>
           </a:xfrm>
         </p:spPr>
         <p:txBody>
           <a:bodyPr>
-            <a:normAutofit fontScale="92500"/>
+            <a:normAutofit lnSpcReduction="10000"/>
           </a:bodyPr>
           <a:lstStyle/>
           <a:p>
@@ -4010,13 +4075,8 @@
             </a:pPr>
             <a:r>
               <a:rPr lang="en-US" sz="1800" dirty="0"/>
-              <a:t>Surface action-oriented individual specific notifications on Teams</a:t>
-            </a:r>
-          </a:p>
-          <a:p>
-            <a:pPr marL="0" indent="0" algn="ctr">
-              <a:buNone/>
-            </a:pPr>
+              <a:t>Excel powered platform for making customized Cashflow Management Apps for mobile first Small Business customers</a:t>
+            </a:r>
             <a:endParaRPr lang="en-IN" sz="1200" dirty="0"/>
           </a:p>
         </p:txBody>
@@ -4048,13 +4108,8 @@
             </a:pPr>
             <a:r>
               <a:rPr lang="en-US" sz="1800" dirty="0"/>
-              <a:t>API evaluation of Lobby Depart Experience* </a:t>
-            </a:r>
-          </a:p>
-          <a:p>
-            <a:pPr marL="0" indent="0" algn="ctr">
-              <a:buNone/>
-            </a:pPr>
+              <a:t>Organization News in Teams</a:t>
+            </a:r>
             <a:endParaRPr lang="en-IN" sz="1200" dirty="0"/>
           </a:p>
         </p:txBody>
@@ -4086,13 +4141,8 @@
             </a:pPr>
             <a:r>
               <a:rPr lang="en-IN" sz="1800" dirty="0"/>
-              <a:t>Intelligent voice assistant for Azure monitor</a:t>
-            </a:r>
-          </a:p>
-          <a:p>
-            <a:pPr marL="0" indent="0" algn="ctr">
-              <a:buNone/>
-            </a:pPr>
+              <a:t>PDF Reflow</a:t>
+            </a:r>
             <a:endParaRPr lang="en-IN" sz="1200" dirty="0"/>
           </a:p>
         </p:txBody>
@@ -4124,13 +4174,8 @@
             </a:pPr>
             <a:r>
               <a:rPr lang="en-US" sz="1800" dirty="0"/>
-              <a:t>Azure DevOps Bots for Slack and Team</a:t>
-            </a:r>
-          </a:p>
-          <a:p>
-            <a:pPr marL="0" indent="0" algn="ctr">
-              <a:buNone/>
-            </a:pPr>
+              <a:t>Teams for EDU - differentiated experience</a:t>
+            </a:r>
             <a:endParaRPr lang="en-IN" sz="1200" dirty="0"/>
           </a:p>
         </p:txBody>
@@ -4147,24 +4192,22 @@
         </p:nvSpPr>
         <p:spPr>
           <a:xfrm>
-            <a:off x="505115" y="4228677"/>
-            <a:ext cx="3283113" cy="788795"/>
+            <a:off x="7996336" y="1392172"/>
+            <a:ext cx="3694922" cy="1063487"/>
           </a:xfrm>
         </p:spPr>
         <p:txBody>
-          <a:bodyPr/>
+          <a:bodyPr>
+            <a:normAutofit fontScale="92500" lnSpcReduction="10000"/>
+          </a:bodyPr>
           <a:lstStyle/>
           <a:p>
             <a:pPr marL="0" indent="0" algn="ctr">
               <a:buNone/>
             </a:pPr>
             <a:r>
-              <a:rPr lang="en-IN" sz="1800" dirty="0" err="1"/>
-              <a:t>Quditor</a:t>
-            </a:r>
-            <a:r>
-              <a:rPr lang="en-IN" sz="1800" dirty="0"/>
-              <a:t>*</a:t>
+              <a:rPr lang="en-US" sz="1800" dirty="0"/>
+              <a:t>Media sharing in Microsoft Teams mobile app: Best-in class video and image sharing platform for modern users.</a:t>
             </a:r>
             <a:endParaRPr lang="en-IN" sz="1200" dirty="0"/>
           </a:p>
@@ -4197,7 +4240,7 @@
             </a:pPr>
             <a:r>
               <a:rPr lang="en-IN" sz="1800" dirty="0"/>
-              <a:t>Microsoft Edge [Anaheim] on Android*</a:t>
+              <a:t>Skill based LU</a:t>
             </a:r>
           </a:p>
         </p:txBody>
@@ -4214,13 +4257,13 @@
         </p:nvSpPr>
         <p:spPr>
           <a:xfrm>
-            <a:off x="8130138" y="4228677"/>
-            <a:ext cx="3283113" cy="788795"/>
+            <a:off x="8130138" y="4228678"/>
+            <a:ext cx="3561120" cy="1071110"/>
           </a:xfrm>
         </p:spPr>
         <p:txBody>
           <a:bodyPr>
-            <a:normAutofit/>
+            <a:normAutofit fontScale="92500" lnSpcReduction="10000"/>
           </a:bodyPr>
           <a:lstStyle/>
           <a:p>
@@ -4229,7 +4272,7 @@
             </a:pPr>
             <a:r>
               <a:rPr lang="en-US" sz="1800" dirty="0"/>
-              <a:t>Defender End Point Protection for iOS*</a:t>
+              <a:t>Multi-Platform User Interface for Mixed and Virtual Reality App to Visualize and Simulate Quantum Computing</a:t>
             </a:r>
             <a:endParaRPr lang="en-IN" sz="1200" dirty="0"/>
           </a:p>
@@ -4262,7 +4305,7 @@
             </a:pPr>
             <a:r>
               <a:rPr lang="en-US" sz="1800" dirty="0"/>
-              <a:t>Activity Feed for One Drive Consumer Web*</a:t>
+              <a:t>Outlook on Jio Phone</a:t>
             </a:r>
           </a:p>
         </p:txBody>
@@ -4299,23 +4342,23 @@
       </p:grpSpPr>
       <p:sp>
         <p:nvSpPr>
-          <p:cNvPr id="2" name="Content Placeholder 1"/>
+          <p:cNvPr id="3" name="Content Placeholder 2"/>
           <p:cNvSpPr>
             <a:spLocks noGrp="1"/>
           </p:cNvSpPr>
           <p:nvPr>
-            <p:ph sz="half" idx="2"/>
+            <p:ph sz="quarter" idx="4"/>
           </p:nvPr>
         </p:nvSpPr>
         <p:spPr>
           <a:xfrm>
-            <a:off x="1" y="1371601"/>
-            <a:ext cx="3916392" cy="788793"/>
+            <a:off x="2526632" y="2779296"/>
+            <a:ext cx="7483642" cy="974557"/>
           </a:xfrm>
         </p:spPr>
         <p:txBody>
           <a:bodyPr>
-            <a:normAutofit fontScale="85000" lnSpcReduction="10000"/>
+            <a:noAutofit/>
           </a:bodyPr>
           <a:lstStyle/>
           <a:p>
@@ -4323,10 +4366,9 @@
               <a:buNone/>
             </a:pPr>
             <a:r>
-              <a:rPr lang="en-US" b="0" dirty="0"/>
-              <a:t>Fraud Linkage Analyzer* </a:t>
-            </a:r>
-            <a:endParaRPr lang="en-US" sz="1800" dirty="0"/>
+              <a:rPr lang="en-IN" sz="5400" dirty="0"/>
+              <a:t>How do we do this?</a:t>
+            </a:r>
           </a:p>
         </p:txBody>
       </p:sp>
@@ -4340,148 +4382,25 @@
             <p:ph type="title"/>
           </p:nvPr>
         </p:nvSpPr>
-        <p:spPr>
-          <a:xfrm>
-            <a:off x="379514" y="132110"/>
-            <a:ext cx="11524432" cy="1063487"/>
-          </a:xfrm>
-        </p:spPr>
-        <p:txBody>
-          <a:bodyPr/>
-          <a:lstStyle/>
-          <a:p>
-            <a:pPr algn="ctr"/>
-            <a:r>
-              <a:rPr lang="en-IN" dirty="0"/>
-              <a:t>Foundry Projects - Bangalore</a:t>
-            </a:r>
-            <a:endParaRPr lang="en-IN" dirty="0">
-              <a:solidFill>
-                <a:srgbClr val="FF0000"/>
-              </a:solidFill>
-            </a:endParaRPr>
-          </a:p>
-        </p:txBody>
-      </p:sp>
-      <p:sp>
-        <p:nvSpPr>
-          <p:cNvPr id="10" name="Content Placeholder 1"/>
-          <p:cNvSpPr>
-            <a:spLocks noGrp="1"/>
-          </p:cNvSpPr>
-          <p:nvPr>
-            <p:ph sz="half" idx="2"/>
-          </p:nvPr>
-        </p:nvSpPr>
-        <p:spPr>
-          <a:xfrm>
-            <a:off x="7685389" y="1371601"/>
-            <a:ext cx="3809925" cy="788795"/>
-          </a:xfrm>
-        </p:spPr>
+        <p:spPr/>
         <p:txBody>
           <a:bodyPr>
-            <a:normAutofit fontScale="85000" lnSpcReduction="20000"/>
+            <a:normAutofit/>
           </a:bodyPr>
           <a:lstStyle/>
           <a:p>
-            <a:pPr marL="0" indent="0" algn="ctr">
-              <a:buNone/>
-            </a:pPr>
-            <a:r>
-              <a:rPr lang="en-US" b="0" dirty="0" err="1"/>
-              <a:t>MyRA</a:t>
-            </a:r>
-            <a:r>
-              <a:rPr lang="en-US" b="0" dirty="0"/>
-              <a:t> - My Research Assistant*</a:t>
-            </a:r>
-            <a:r>
-              <a:rPr lang="en-US" sz="1800" dirty="0"/>
-              <a:t> </a:t>
-            </a:r>
-            <a:endParaRPr lang="fr-FR" sz="1800" dirty="0"/>
-          </a:p>
-        </p:txBody>
-      </p:sp>
-      <p:sp>
-        <p:nvSpPr>
-          <p:cNvPr id="13" name="Content Placeholder 1"/>
-          <p:cNvSpPr>
-            <a:spLocks noGrp="1"/>
-          </p:cNvSpPr>
-          <p:nvPr>
-            <p:ph sz="half" idx="2"/>
-          </p:nvPr>
-        </p:nvSpPr>
-        <p:spPr>
-          <a:xfrm>
-            <a:off x="1587991" y="2914015"/>
-            <a:ext cx="3558774" cy="1314662"/>
-          </a:xfrm>
-        </p:spPr>
-        <p:txBody>
-          <a:bodyPr>
-            <a:normAutofit fontScale="85000" lnSpcReduction="10000"/>
-          </a:bodyPr>
-          <a:lstStyle/>
-          <a:p>
-            <a:pPr marL="0" indent="0" algn="ctr">
-              <a:buNone/>
-            </a:pPr>
-            <a:r>
-              <a:rPr lang="en-US" b="0" dirty="0"/>
-              <a:t>Smart Walking Stick - Low cost edition for Developing markets</a:t>
-            </a:r>
-            <a:r>
-              <a:rPr lang="en-US" sz="1800" dirty="0"/>
-              <a:t> </a:t>
-            </a:r>
-            <a:endParaRPr lang="en-IN" sz="1200" dirty="0"/>
-          </a:p>
-        </p:txBody>
-      </p:sp>
-      <p:sp>
-        <p:nvSpPr>
-          <p:cNvPr id="17" name="Content Placeholder 1"/>
-          <p:cNvSpPr>
-            <a:spLocks noGrp="1"/>
-          </p:cNvSpPr>
-          <p:nvPr>
-            <p:ph sz="half" idx="2"/>
-          </p:nvPr>
-        </p:nvSpPr>
-        <p:spPr>
-          <a:xfrm>
-            <a:off x="6667098" y="2910326"/>
-            <a:ext cx="3378239" cy="1257724"/>
-          </a:xfrm>
-        </p:spPr>
-        <p:txBody>
-          <a:bodyPr>
-            <a:normAutofit fontScale="92500" lnSpcReduction="20000"/>
-          </a:bodyPr>
-          <a:lstStyle/>
-          <a:p>
-            <a:pPr marL="0" indent="0" algn="ctr">
-              <a:buNone/>
-            </a:pPr>
-            <a:r>
-              <a:rPr lang="en-US" b="0" dirty="0"/>
-              <a:t>Modern Employee Intranet on Microsoft Teams*</a:t>
-            </a:r>
-            <a:r>
-              <a:rPr lang="en-US" sz="1800" dirty="0"/>
-              <a:t> </a:t>
-            </a:r>
-            <a:endParaRPr lang="en-IN" sz="1200" dirty="0"/>
+            <a:pPr algn="ctr"/>
+            <a:r>
+              <a:rPr lang="en-IN" dirty="0"/>
+              <a:t>The Garage India Internship Projects Projects</a:t>
+            </a:r>
           </a:p>
         </p:txBody>
       </p:sp>
     </p:spTree>
     <p:extLst>
       <p:ext uri="{BB962C8B-B14F-4D97-AF65-F5344CB8AC3E}">
-        <p14:creationId xmlns:p14="http://schemas.microsoft.com/office/powerpoint/2010/main" val="3409493168"/>
+        <p14:creationId xmlns:p14="http://schemas.microsoft.com/office/powerpoint/2010/main" val="1089944936"/>
       </p:ext>
     </p:extLst>
   </p:cSld>
@@ -4510,91 +4429,6 @@
       </p:grpSpPr>
       <p:sp>
         <p:nvSpPr>
-          <p:cNvPr id="3" name="Content Placeholder 2"/>
-          <p:cNvSpPr>
-            <a:spLocks noGrp="1"/>
-          </p:cNvSpPr>
-          <p:nvPr>
-            <p:ph sz="quarter" idx="4"/>
-          </p:nvPr>
-        </p:nvSpPr>
-        <p:spPr>
-          <a:xfrm>
-            <a:off x="2526632" y="2779296"/>
-            <a:ext cx="7483642" cy="974557"/>
-          </a:xfrm>
-        </p:spPr>
-        <p:txBody>
-          <a:bodyPr>
-            <a:noAutofit/>
-          </a:bodyPr>
-          <a:lstStyle/>
-          <a:p>
-            <a:pPr marL="0" indent="0" algn="ctr">
-              <a:buNone/>
-            </a:pPr>
-            <a:r>
-              <a:rPr lang="en-IN" sz="5400" dirty="0"/>
-              <a:t>How do we do this?</a:t>
-            </a:r>
-          </a:p>
-        </p:txBody>
-      </p:sp>
-      <p:sp>
-        <p:nvSpPr>
-          <p:cNvPr id="4" name="Title 3"/>
-          <p:cNvSpPr>
-            <a:spLocks noGrp="1"/>
-          </p:cNvSpPr>
-          <p:nvPr>
-            <p:ph type="title"/>
-          </p:nvPr>
-        </p:nvSpPr>
-        <p:spPr/>
-        <p:txBody>
-          <a:bodyPr/>
-          <a:lstStyle/>
-          <a:p>
-            <a:pPr algn="ctr"/>
-            <a:r>
-              <a:rPr lang="en-IN" dirty="0"/>
-              <a:t>Foundry Projects</a:t>
-            </a:r>
-          </a:p>
-        </p:txBody>
-      </p:sp>
-    </p:spTree>
-    <p:extLst>
-      <p:ext uri="{BB962C8B-B14F-4D97-AF65-F5344CB8AC3E}">
-        <p14:creationId xmlns:p14="http://schemas.microsoft.com/office/powerpoint/2010/main" val="1089944936"/>
-      </p:ext>
-    </p:extLst>
-  </p:cSld>
-  <p:clrMapOvr>
-    <a:masterClrMapping/>
-  </p:clrMapOvr>
-</p:sld>
-</file>
-
-<file path=ppt/slides/slide7.xml><?xml version="1.0" encoding="utf-8"?>
-<p:sld xmlns:a="http://schemas.openxmlformats.org/drawingml/2006/main" xmlns:r="http://schemas.openxmlformats.org/officeDocument/2006/relationships" xmlns:p="http://schemas.openxmlformats.org/presentationml/2006/main">
-  <p:cSld>
-    <p:spTree>
-      <p:nvGrpSpPr>
-        <p:cNvPr id="1" name=""/>
-        <p:cNvGrpSpPr/>
-        <p:nvPr/>
-      </p:nvGrpSpPr>
-      <p:grpSpPr>
-        <a:xfrm>
-          <a:off x="0" y="0"/>
-          <a:ext cx="0" cy="0"/>
-          <a:chOff x="0" y="0"/>
-          <a:chExt cx="0" cy="0"/>
-        </a:xfrm>
-      </p:grpSpPr>
-      <p:sp>
-        <p:nvSpPr>
           <p:cNvPr id="2" name="Title 1"/>
           <p:cNvSpPr>
             <a:spLocks noGrp="1"/>
@@ -4644,83 +4478,54 @@
             </a:r>
             <a:r>
               <a:rPr lang="en-IN" sz="1800" dirty="0"/>
-              <a:t> – Start 09:30</a:t>
+              <a:t> – Start 10:00</a:t>
             </a:r>
             <a:endParaRPr lang="en-IN" sz="2800" dirty="0"/>
           </a:p>
           <a:p>
             <a:r>
               <a:rPr lang="en-IN" sz="1400" dirty="0"/>
-              <a:t>Introduction to a lot of things </a:t>
-            </a:r>
-          </a:p>
-          <a:p>
+              <a:t>Agile/Git</a:t>
+            </a:r>
+          </a:p>
+          <a:p>
+            <a:r>
+              <a:rPr lang="en-IN" sz="1400" dirty="0" err="1"/>
+              <a:t>.Net</a:t>
+            </a:r>
             <a:r>
               <a:rPr lang="en-IN" sz="1400" dirty="0"/>
-              <a:t>Agile Methodology and Tools</a:t>
+              <a:t> /C# Sample hands on</a:t>
+            </a:r>
+          </a:p>
+          <a:p>
+            <a:r>
+              <a:rPr lang="en-IN" sz="1400" b="1" dirty="0"/>
+              <a:t>Lunch (13:00 – 14:00)</a:t>
             </a:r>
           </a:p>
           <a:p>
             <a:r>
               <a:rPr lang="en-IN" sz="1400" dirty="0"/>
-              <a:t>Introduction to </a:t>
-            </a:r>
-            <a:r>
-              <a:rPr lang="en-IN" sz="1400" dirty="0" err="1"/>
-              <a:t>.net</a:t>
-            </a:r>
+              <a:t>Web API, Sample</a:t>
+            </a:r>
+          </a:p>
+          <a:p>
             <a:r>
               <a:rPr lang="en-IN" sz="1400" dirty="0"/>
-              <a:t> and C#</a:t>
+              <a:t>Azure Fundamentals</a:t>
+            </a:r>
+          </a:p>
+          <a:p>
+            <a:r>
+              <a:rPr lang="en-IN" sz="1400" dirty="0"/>
+              <a:t>Node, Express, Mongo</a:t>
             </a:r>
           </a:p>
           <a:p>
             <a:r>
               <a:rPr lang="en-IN" sz="1400" b="1" dirty="0"/>
-              <a:t>Lunch (12:30 – 13:30)</a:t>
-            </a:r>
-          </a:p>
-          <a:p>
-            <a:r>
-              <a:rPr lang="en-IN" sz="1400" dirty="0"/>
-              <a:t>Python</a:t>
-            </a:r>
-          </a:p>
-          <a:p>
-            <a:r>
-              <a:rPr lang="en-IN" sz="1400" dirty="0" err="1"/>
-              <a:t>Javascript</a:t>
-            </a:r>
-            <a:endParaRPr lang="en-IN" sz="1400" dirty="0"/>
-          </a:p>
-          <a:p>
-            <a:r>
-              <a:rPr lang="en-IN" sz="1400" dirty="0"/>
-              <a:t>Browser extensions</a:t>
-            </a:r>
-          </a:p>
-          <a:p>
-            <a:r>
-              <a:rPr lang="en-IN" sz="1400" b="1" dirty="0"/>
-              <a:t>Snacks (16:00 - 16:30)</a:t>
-            </a:r>
-          </a:p>
-          <a:p>
-            <a:r>
-              <a:rPr lang="en-IN" sz="1400" dirty="0"/>
-              <a:t>Introduction to Azure</a:t>
-            </a:r>
-          </a:p>
-          <a:p>
-            <a:r>
-              <a:rPr lang="en-IN" sz="1400" dirty="0"/>
-              <a:t>Exercises of the day</a:t>
-            </a:r>
-          </a:p>
-          <a:p>
-            <a:r>
-              <a:rPr lang="en-IN" sz="1400" b="1" dirty="0"/>
-              <a:t>Day end (18:00)</a:t>
+              <a:t>Day end (17:00)</a:t>
             </a:r>
           </a:p>
         </p:txBody>
@@ -4900,68 +4705,61 @@
             </a:r>
             <a:r>
               <a:rPr lang="en-IN" sz="1800" dirty="0"/>
-              <a:t>– Start 09:30</a:t>
+              <a:t>– Start 10:00</a:t>
             </a:r>
           </a:p>
           <a:p>
             <a:r>
               <a:rPr lang="en-IN" sz="1400" dirty="0"/>
-              <a:t>Introduction to NodeJS and Angular</a:t>
+              <a:t>Android Programming</a:t>
             </a:r>
           </a:p>
           <a:p>
             <a:r>
               <a:rPr lang="en-IN" sz="1400" dirty="0"/>
-              <a:t>Introduction to ReactJS</a:t>
+              <a:t>React JS</a:t>
             </a:r>
           </a:p>
           <a:p>
             <a:r>
               <a:rPr lang="en-IN" sz="1400" dirty="0"/>
-              <a:t>Cognitive services</a:t>
+              <a:t>Quantum Basics</a:t>
             </a:r>
           </a:p>
           <a:p>
             <a:r>
               <a:rPr lang="en-IN" sz="1400" b="1" dirty="0"/>
-              <a:t>Lunch (12:30 – 13:30)</a:t>
+              <a:t>Lunch (13:00 – 14:00)</a:t>
             </a:r>
           </a:p>
           <a:p>
             <a:r>
               <a:rPr lang="en-IN" sz="1400" dirty="0"/>
-              <a:t>Azure SQL</a:t>
+              <a:t>Microsoft SQL Server</a:t>
             </a:r>
           </a:p>
           <a:p>
             <a:r>
               <a:rPr lang="en-IN" sz="1400" dirty="0"/>
-              <a:t>Web services</a:t>
+              <a:t>Azure Data factory</a:t>
+            </a:r>
+          </a:p>
+          <a:p>
+            <a:r>
+              <a:rPr lang="en-IN" sz="1400" dirty="0"/>
+              <a:t>Azure Data Lake</a:t>
+            </a:r>
+          </a:p>
+          <a:p>
+            <a:r>
+              <a:rPr lang="en-IN" sz="1400" dirty="0"/>
+              <a:t>Azure Databricks</a:t>
             </a:r>
           </a:p>
           <a:p>
             <a:r>
               <a:rPr lang="en-IN" sz="1400" b="1" dirty="0"/>
-              <a:t>Snacks (16:00 - 16:30)</a:t>
-            </a:r>
-          </a:p>
-          <a:p>
-            <a:r>
-              <a:rPr lang="en-IN" sz="1400" dirty="0"/>
-              <a:t>Bot Framework</a:t>
-            </a:r>
-          </a:p>
-          <a:p>
-            <a:r>
-              <a:rPr lang="en-IN" sz="1400" dirty="0" err="1"/>
-              <a:t>CosmosDB</a:t>
-            </a:r>
-            <a:endParaRPr lang="en-IN" sz="1400" dirty="0"/>
-          </a:p>
-          <a:p>
-            <a:r>
-              <a:rPr lang="en-IN" sz="1400" b="1" dirty="0"/>
-              <a:t>Day end (18:00)</a:t>
+              <a:t>Day end (17:30)</a:t>
             </a:r>
           </a:p>
         </p:txBody>
@@ -5145,72 +4943,49 @@
             </a:r>
             <a:r>
               <a:rPr lang="en-IN" sz="1800" dirty="0"/>
-              <a:t>– Start 09:30</a:t>
+              <a:t>– Start 10:00</a:t>
             </a:r>
           </a:p>
           <a:p>
             <a:r>
               <a:rPr lang="en-IN" sz="1400" dirty="0"/>
-              <a:t>Machine Learning</a:t>
+              <a:t>React Native</a:t>
             </a:r>
           </a:p>
           <a:p>
             <a:r>
               <a:rPr lang="en-IN" sz="1400" dirty="0"/>
-              <a:t>Deep Learning</a:t>
-            </a:r>
-          </a:p>
-          <a:p>
-            <a:r>
-              <a:rPr lang="en-IN" sz="1400" dirty="0" err="1"/>
-              <a:t>Scikit</a:t>
-            </a:r>
+              <a:t>Power BI</a:t>
+            </a:r>
+          </a:p>
+          <a:p>
             <a:r>
               <a:rPr lang="en-IN" sz="1400" dirty="0"/>
-              <a:t> learning</a:t>
+              <a:t>Basic ML and DL</a:t>
+            </a:r>
+          </a:p>
+          <a:p>
+            <a:r>
+              <a:rPr lang="en-IN" sz="1400" b="1" dirty="0"/>
+              <a:t>Lunch (12:30 – 14:00)</a:t>
             </a:r>
           </a:p>
           <a:p>
             <a:r>
               <a:rPr lang="en-IN" sz="1400" dirty="0"/>
-              <a:t>LUIS</a:t>
+              <a:t>Time series, LSTM, ARIMA</a:t>
+            </a:r>
+          </a:p>
+          <a:p>
+            <a:r>
+              <a:rPr lang="en-IN" sz="1400" dirty="0"/>
+              <a:t>Quantum - Advanced</a:t>
             </a:r>
           </a:p>
           <a:p>
             <a:r>
               <a:rPr lang="en-IN" sz="1400" b="1" dirty="0"/>
-              <a:t>Lunch (12:30 – 13:30)</a:t>
-            </a:r>
-          </a:p>
-          <a:p>
-            <a:r>
-              <a:rPr lang="en-IN" sz="1400" dirty="0"/>
-              <a:t>Android Development</a:t>
-            </a:r>
-          </a:p>
-          <a:p>
-            <a:r>
-              <a:rPr lang="en-IN" sz="1400" dirty="0"/>
-              <a:t>iOS development</a:t>
-            </a:r>
-          </a:p>
-          <a:p>
-            <a:r>
-              <a:rPr lang="en-IN" sz="1400" b="1" dirty="0"/>
-              <a:t>Snacks (16:00 - 16:30)</a:t>
-            </a:r>
-            <a:endParaRPr lang="en-IN" sz="1400" dirty="0"/>
-          </a:p>
-          <a:p>
-            <a:r>
-              <a:rPr lang="en-IN" sz="1400" dirty="0"/>
-              <a:t>Exercises of the day</a:t>
-            </a:r>
-          </a:p>
-          <a:p>
-            <a:r>
-              <a:rPr lang="en-IN" sz="1400" b="1" dirty="0"/>
-              <a:t>Day end (18:00)</a:t>
+              <a:t>Day end (16:00)</a:t>
             </a:r>
           </a:p>
           <a:p>
@@ -5235,7 +5010,7 @@
 </p:sld>
 </file>
 
-<file path=ppt/slides/slide8.xml><?xml version="1.0" encoding="utf-8"?>
+<file path=ppt/slides/slide7.xml><?xml version="1.0" encoding="utf-8"?>
 <p:sld xmlns:a="http://schemas.openxmlformats.org/drawingml/2006/main" xmlns:r="http://schemas.openxmlformats.org/officeDocument/2006/relationships" xmlns:p="http://schemas.openxmlformats.org/presentationml/2006/main">
   <p:cSld>
     <p:spTree>
@@ -5302,7 +5077,7 @@
             <a:pPr algn="ctr"/>
             <a:r>
               <a:rPr lang="en-IN" dirty="0"/>
-              <a:t>Foundry Projects</a:t>
+              <a:t>The Garage India Internship Projects Projects</a:t>
             </a:r>
           </a:p>
         </p:txBody>
@@ -6105,6 +5880,15 @@
 </file>
 
 <file path=customXml/item1.xml><?xml version="1.0" encoding="utf-8"?>
+<?mso-contentType ?>
+<FormTemplates xmlns="http://schemas.microsoft.com/sharepoint/v3/contenttype/forms">
+  <Display>DocumentLibraryForm</Display>
+  <Edit>DocumentLibraryForm</Edit>
+  <New>DocumentLibraryForm</New>
+</FormTemplates>
+</file>
+
+<file path=customXml/item2.xml><?xml version="1.0" encoding="utf-8"?>
 <ct:contentTypeSchema xmlns:ct="http://schemas.microsoft.com/office/2006/metadata/contentType" xmlns:ma="http://schemas.microsoft.com/office/2006/metadata/properties/metaAttributes" ct:_="" ma:_="" ma:contentTypeName="Document" ma:contentTypeID="0x01010011DC54E8FA166940A7080F84F8CB43C0" ma:contentTypeVersion="5" ma:contentTypeDescription="Create a new document." ma:contentTypeScope="" ma:versionID="cf59c618f8906941c836d93f4042696d">
   <xsd:schema xmlns:xsd="http://www.w3.org/2001/XMLSchema" xmlns:xs="http://www.w3.org/2001/XMLSchema" xmlns:p="http://schemas.microsoft.com/office/2006/metadata/properties" xmlns:ns2="49f23ff1-7de2-4e77-8ccc-6638caaacb57" targetNamespace="http://schemas.microsoft.com/office/2006/metadata/properties" ma:root="true" ma:fieldsID="2f21f176a9e5873be5e0250de8bfe910" ns2:_="">
     <xsd:import namespace="49f23ff1-7de2-4e77-8ccc-6638caaacb57"/>
@@ -6254,15 +6038,6 @@
 </ct:contentTypeSchema>
 </file>
 
-<file path=customXml/item2.xml><?xml version="1.0" encoding="utf-8"?>
-<?mso-contentType ?>
-<FormTemplates xmlns="http://schemas.microsoft.com/sharepoint/v3/contenttype/forms">
-  <Display>DocumentLibraryForm</Display>
-  <Edit>DocumentLibraryForm</Edit>
-  <New>DocumentLibraryForm</New>
-</FormTemplates>
-</file>
-
 <file path=customXml/item3.xml><?xml version="1.0" encoding="utf-8"?>
 <p:properties xmlns:p="http://schemas.microsoft.com/office/2006/metadata/properties" xmlns:xsi="http://www.w3.org/2001/XMLSchema-instance" xmlns:pc="http://schemas.microsoft.com/office/infopath/2007/PartnerControls">
   <documentManagement/>
@@ -6270,6 +6045,14 @@
 </file>
 
 <file path=customXml/itemProps1.xml><?xml version="1.0" encoding="utf-8"?>
+<ds:datastoreItem xmlns:ds="http://schemas.openxmlformats.org/officeDocument/2006/customXml" ds:itemID="{B0CA13EC-1D3C-4D6F-8D1C-E8A452CFC79A}">
+  <ds:schemaRefs>
+    <ds:schemaRef ds:uri="http://schemas.microsoft.com/sharepoint/v3/contenttype/forms"/>
+  </ds:schemaRefs>
+</ds:datastoreItem>
+</file>
+
+<file path=customXml/itemProps2.xml><?xml version="1.0" encoding="utf-8"?>
 <ds:datastoreItem xmlns:ds="http://schemas.openxmlformats.org/officeDocument/2006/customXml" ds:itemID="{9981D766-8238-4C46-BFD3-328D25F01F6A}">
   <ds:schemaRefs>
     <ds:schemaRef ds:uri="http://schemas.microsoft.com/office/2006/metadata/contentType"/>
@@ -6283,14 +6066,6 @@
     <ds:schemaRef ds:uri="http://purl.org/dc/elements/1.1/"/>
     <ds:schemaRef ds:uri="http://purl.org/dc/terms/"/>
     <ds:schemaRef ds:uri="http://schemas.microsoft.com/internal/obd"/>
-  </ds:schemaRefs>
-</ds:datastoreItem>
-</file>
-
-<file path=customXml/itemProps2.xml><?xml version="1.0" encoding="utf-8"?>
-<ds:datastoreItem xmlns:ds="http://schemas.openxmlformats.org/officeDocument/2006/customXml" ds:itemID="{B0CA13EC-1D3C-4D6F-8D1C-E8A452CFC79A}">
-  <ds:schemaRefs>
-    <ds:schemaRef ds:uri="http://schemas.microsoft.com/sharepoint/v3/contenttype/forms"/>
   </ds:schemaRefs>
 </ds:datastoreItem>
 </file>

</xml_diff>